<commit_message>
feat(models): add all models
</commit_message>
<xml_diff>
--- a/אפיון בצפר.pptx
+++ b/אפיון בצפר.pptx
@@ -108,6 +108,11 @@
       </a:defRPr>
     </a:lvl9pPr>
   </p:defaultTextStyle>
+  <p:extLst>
+    <p:ext uri="{EFAFB233-063F-42B5-8137-9DF3F51BA10A}">
+      <p15:sldGuideLst xmlns:p15="http://schemas.microsoft.com/office/powerpoint/2012/main"/>
+    </p:ext>
+  </p:extLst>
 </p:presentation>
 </file>
 
@@ -300,7 +305,7 @@
           <a:p>
             <a:fld id="{0F0C29A8-DCB4-49A7-A7FC-A1B7B18EE0FE}" type="datetimeFigureOut">
               <a:rPr lang="en-US" smtClean="0"/>
-              <a:t>31-May-21</a:t>
+              <a:t>6/3/2021</a:t>
             </a:fld>
             <a:endParaRPr lang="en-US"/>
           </a:p>
@@ -500,7 +505,7 @@
           <a:p>
             <a:fld id="{0F0C29A8-DCB4-49A7-A7FC-A1B7B18EE0FE}" type="datetimeFigureOut">
               <a:rPr lang="en-US" smtClean="0"/>
-              <a:t>31-May-21</a:t>
+              <a:t>6/3/2021</a:t>
             </a:fld>
             <a:endParaRPr lang="en-US"/>
           </a:p>
@@ -710,7 +715,7 @@
           <a:p>
             <a:fld id="{0F0C29A8-DCB4-49A7-A7FC-A1B7B18EE0FE}" type="datetimeFigureOut">
               <a:rPr lang="en-US" smtClean="0"/>
-              <a:t>31-May-21</a:t>
+              <a:t>6/3/2021</a:t>
             </a:fld>
             <a:endParaRPr lang="en-US"/>
           </a:p>
@@ -910,7 +915,7 @@
           <a:p>
             <a:fld id="{0F0C29A8-DCB4-49A7-A7FC-A1B7B18EE0FE}" type="datetimeFigureOut">
               <a:rPr lang="en-US" smtClean="0"/>
-              <a:t>31-May-21</a:t>
+              <a:t>6/3/2021</a:t>
             </a:fld>
             <a:endParaRPr lang="en-US"/>
           </a:p>
@@ -1186,7 +1191,7 @@
           <a:p>
             <a:fld id="{0F0C29A8-DCB4-49A7-A7FC-A1B7B18EE0FE}" type="datetimeFigureOut">
               <a:rPr lang="en-US" smtClean="0"/>
-              <a:t>31-May-21</a:t>
+              <a:t>6/3/2021</a:t>
             </a:fld>
             <a:endParaRPr lang="en-US"/>
           </a:p>
@@ -1454,7 +1459,7 @@
           <a:p>
             <a:fld id="{0F0C29A8-DCB4-49A7-A7FC-A1B7B18EE0FE}" type="datetimeFigureOut">
               <a:rPr lang="en-US" smtClean="0"/>
-              <a:t>31-May-21</a:t>
+              <a:t>6/3/2021</a:t>
             </a:fld>
             <a:endParaRPr lang="en-US"/>
           </a:p>
@@ -1869,7 +1874,7 @@
           <a:p>
             <a:fld id="{0F0C29A8-DCB4-49A7-A7FC-A1B7B18EE0FE}" type="datetimeFigureOut">
               <a:rPr lang="en-US" smtClean="0"/>
-              <a:t>31-May-21</a:t>
+              <a:t>6/3/2021</a:t>
             </a:fld>
             <a:endParaRPr lang="en-US"/>
           </a:p>
@@ -2011,7 +2016,7 @@
           <a:p>
             <a:fld id="{0F0C29A8-DCB4-49A7-A7FC-A1B7B18EE0FE}" type="datetimeFigureOut">
               <a:rPr lang="en-US" smtClean="0"/>
-              <a:t>31-May-21</a:t>
+              <a:t>6/3/2021</a:t>
             </a:fld>
             <a:endParaRPr lang="en-US"/>
           </a:p>
@@ -2124,7 +2129,7 @@
           <a:p>
             <a:fld id="{0F0C29A8-DCB4-49A7-A7FC-A1B7B18EE0FE}" type="datetimeFigureOut">
               <a:rPr lang="en-US" smtClean="0"/>
-              <a:t>31-May-21</a:t>
+              <a:t>6/3/2021</a:t>
             </a:fld>
             <a:endParaRPr lang="en-US"/>
           </a:p>
@@ -2437,7 +2442,7 @@
           <a:p>
             <a:fld id="{0F0C29A8-DCB4-49A7-A7FC-A1B7B18EE0FE}" type="datetimeFigureOut">
               <a:rPr lang="en-US" smtClean="0"/>
-              <a:t>31-May-21</a:t>
+              <a:t>6/3/2021</a:t>
             </a:fld>
             <a:endParaRPr lang="en-US"/>
           </a:p>
@@ -2726,7 +2731,7 @@
           <a:p>
             <a:fld id="{0F0C29A8-DCB4-49A7-A7FC-A1B7B18EE0FE}" type="datetimeFigureOut">
               <a:rPr lang="en-US" smtClean="0"/>
-              <a:t>31-May-21</a:t>
+              <a:t>6/3/2021</a:t>
             </a:fld>
             <a:endParaRPr lang="en-US"/>
           </a:p>
@@ -2969,7 +2974,7 @@
           <a:p>
             <a:fld id="{0F0C29A8-DCB4-49A7-A7FC-A1B7B18EE0FE}" type="datetimeFigureOut">
               <a:rPr lang="en-US" smtClean="0"/>
-              <a:t>31-May-21</a:t>
+              <a:t>6/3/2021</a:t>
             </a:fld>
             <a:endParaRPr lang="en-US"/>
           </a:p>
@@ -5180,7 +5185,7 @@
           <p:nvPr>
             <p:extLst>
               <p:ext uri="{D42A27DB-BD31-4B8C-83A1-F6EECF244321}">
-                <p14:modId xmlns:p14="http://schemas.microsoft.com/office/powerpoint/2010/main" val="3673074677"/>
+                <p14:modId xmlns:p14="http://schemas.microsoft.com/office/powerpoint/2010/main" val="3230545754"/>
               </p:ext>
             </p:extLst>
           </p:nvPr>
@@ -5281,7 +5286,7 @@
                       </a:r>
                       <a:r>
                         <a:rPr lang="he-IL" dirty="0"/>
-                        <a:t>)</a:t>
+                        <a:t>), סיסמה, תעודת זהות (כשם משתמש)</a:t>
                       </a:r>
                       <a:endParaRPr lang="en-US" dirty="0"/>
                     </a:p>
@@ -5539,6 +5544,10 @@
                     <a:bodyPr/>
                     <a:lstStyle/>
                     <a:p>
+                      <a:r>
+                        <a:rPr lang="he-IL" dirty="0"/>
+                        <a:t>כיתה</a:t>
+                      </a:r>
                       <a:endParaRPr lang="en-US" dirty="0"/>
                     </a:p>
                   </a:txBody>

</xml_diff>